<commit_message>
Repair_One ar trebui sa puste dar nu o face
</commit_message>
<xml_diff>
--- a/docs/Prezentare.pptx
+++ b/docs/Prezentare.pptx
@@ -3770,8 +3770,10 @@
       </p:grpSpPr>
       <p:pic>
         <p:nvPicPr>
-          <p:cNvPr id="7" name="Imagine 6"/>
-          <p:cNvPicPr/>
+          <p:cNvPr id="7170" name="Picture 2"/>
+          <p:cNvPicPr>
+            <a:picLocks noChangeAspect="1" noChangeArrowheads="1"/>
+          </p:cNvPicPr>
           <p:nvPr/>
         </p:nvPicPr>
         <p:blipFill>
@@ -3783,8 +3785,8 @@
         </p:blipFill>
         <p:spPr bwMode="auto">
           <a:xfrm>
-            <a:off x="285720" y="2000240"/>
-            <a:ext cx="8643998" cy="4000528"/>
+            <a:off x="2071670" y="2928934"/>
+            <a:ext cx="4857784" cy="1948888"/>
           </a:xfrm>
           <a:prstGeom prst="rect">
             <a:avLst/>
@@ -3796,6 +3798,7 @@
             <a:headEnd/>
             <a:tailEnd/>
           </a:ln>
+          <a:effectLst/>
         </p:spPr>
       </p:pic>
       <p:sp>
@@ -3833,11 +3836,7 @@
             </a:r>
             <a:r>
               <a:rPr lang="ro-RO" dirty="0" smtClean="0"/>
-              <a:t> alte </a:t>
-            </a:r>
-            <a:r>
-              <a:rPr lang="ro-RO" dirty="0" smtClean="0"/>
-              <a:t>metode (titlu temporar)</a:t>
+              <a:t> alte metode (titlu temporar)</a:t>
             </a:r>
             <a:endParaRPr lang="ro-RO" dirty="0"/>
           </a:p>
@@ -3845,7 +3844,7 @@
       </p:sp>
       <p:pic>
         <p:nvPicPr>
-          <p:cNvPr id="7170" name="Picture 2"/>
+          <p:cNvPr id="2395" name="Picture 347"/>
           <p:cNvPicPr>
             <a:picLocks noChangeAspect="1" noChangeArrowheads="1"/>
           </p:cNvPicPr>
@@ -3860,8 +3859,8 @@
         </p:blipFill>
         <p:spPr bwMode="auto">
           <a:xfrm>
-            <a:off x="2214546" y="3143248"/>
-            <a:ext cx="4857784" cy="1948888"/>
+            <a:off x="0" y="1928802"/>
+            <a:ext cx="9144000" cy="4353339"/>
           </a:xfrm>
           <a:prstGeom prst="rect">
             <a:avLst/>
@@ -3884,7 +3883,75 @@
   <p:timing>
     <p:tnLst>
       <p:par>
-        <p:cTn id="1" dur="indefinite" restart="never" nodeType="tmRoot"/>
+        <p:cTn id="1" dur="indefinite" restart="never" nodeType="tmRoot">
+          <p:childTnLst>
+            <p:seq concurrent="1" nextAc="seek">
+              <p:cTn id="2" dur="indefinite" nodeType="mainSeq">
+                <p:childTnLst>
+                  <p:par>
+                    <p:cTn id="3" fill="hold">
+                      <p:stCondLst>
+                        <p:cond delay="indefinite"/>
+                      </p:stCondLst>
+                      <p:childTnLst>
+                        <p:par>
+                          <p:cTn id="4" fill="hold">
+                            <p:stCondLst>
+                              <p:cond delay="0"/>
+                            </p:stCondLst>
+                            <p:childTnLst>
+                              <p:par>
+                                <p:cTn id="5" presetID="1" presetClass="entr" presetSubtype="0" fill="hold" nodeType="clickEffect">
+                                  <p:stCondLst>
+                                    <p:cond delay="0"/>
+                                  </p:stCondLst>
+                                  <p:childTnLst>
+                                    <p:set>
+                                      <p:cBhvr>
+                                        <p:cTn id="6" dur="1" fill="hold">
+                                          <p:stCondLst>
+                                            <p:cond delay="0"/>
+                                          </p:stCondLst>
+                                        </p:cTn>
+                                        <p:tgtEl>
+                                          <p:spTgt spid="2395"/>
+                                        </p:tgtEl>
+                                        <p:attrNameLst>
+                                          <p:attrName>style.visibility</p:attrName>
+                                        </p:attrNameLst>
+                                      </p:cBhvr>
+                                      <p:to>
+                                        <p:strVal val="visible"/>
+                                      </p:to>
+                                    </p:set>
+                                  </p:childTnLst>
+                                </p:cTn>
+                              </p:par>
+                            </p:childTnLst>
+                          </p:cTn>
+                        </p:par>
+                      </p:childTnLst>
+                    </p:cTn>
+                  </p:par>
+                </p:childTnLst>
+              </p:cTn>
+              <p:prevCondLst>
+                <p:cond evt="onPrev" delay="0">
+                  <p:tgtEl>
+                    <p:sldTgt/>
+                  </p:tgtEl>
+                </p:cond>
+              </p:prevCondLst>
+              <p:nextCondLst>
+                <p:cond evt="onNext" delay="0">
+                  <p:tgtEl>
+                    <p:sldTgt/>
+                  </p:tgtEl>
+                </p:cond>
+              </p:nextCondLst>
+            </p:seq>
+          </p:childTnLst>
+        </p:cTn>
       </p:par>
     </p:tnLst>
   </p:timing>
@@ -4321,7 +4388,7 @@
       </p:sp>
       <p:pic>
         <p:nvPicPr>
-          <p:cNvPr id="6146" name="Picture 2" descr="D:\git\Licenta\Discuri\docs\imgs\used\pred.png"/>
+          <p:cNvPr id="1026" name="Picture 2" descr="C:\Users\Alex\Desktop\1.png"/>
           <p:cNvPicPr>
             <a:picLocks noChangeAspect="1" noChangeArrowheads="1"/>
           </p:cNvPicPr>
@@ -4336,8 +4403,216 @@
         </p:blipFill>
         <p:spPr bwMode="auto">
           <a:xfrm>
-            <a:off x="0" y="2714620"/>
-            <a:ext cx="9144000" cy="3286125"/>
+            <a:off x="91889" y="3000372"/>
+            <a:ext cx="8909267" cy="2309810"/>
+          </a:xfrm>
+          <a:prstGeom prst="rect">
+            <a:avLst/>
+          </a:prstGeom>
+          <a:noFill/>
+        </p:spPr>
+      </p:pic>
+      <p:pic>
+        <p:nvPicPr>
+          <p:cNvPr id="1027" name="Picture 3" descr="C:\Users\Alex\Desktop\2.png"/>
+          <p:cNvPicPr>
+            <a:picLocks noChangeAspect="1" noChangeArrowheads="1"/>
+          </p:cNvPicPr>
+          <p:nvPr/>
+        </p:nvPicPr>
+        <p:blipFill>
+          <a:blip r:embed="rId3"/>
+          <a:srcRect/>
+          <a:stretch>
+            <a:fillRect/>
+          </a:stretch>
+        </p:blipFill>
+        <p:spPr bwMode="auto">
+          <a:xfrm>
+            <a:off x="91889" y="3000372"/>
+            <a:ext cx="8909267" cy="2309810"/>
+          </a:xfrm>
+          <a:prstGeom prst="rect">
+            <a:avLst/>
+          </a:prstGeom>
+          <a:noFill/>
+        </p:spPr>
+      </p:pic>
+      <p:pic>
+        <p:nvPicPr>
+          <p:cNvPr id="1028" name="Picture 4" descr="C:\Users\Alex\Desktop\3.png"/>
+          <p:cNvPicPr>
+            <a:picLocks noChangeAspect="1" noChangeArrowheads="1"/>
+          </p:cNvPicPr>
+          <p:nvPr/>
+        </p:nvPicPr>
+        <p:blipFill>
+          <a:blip r:embed="rId4"/>
+          <a:srcRect/>
+          <a:stretch>
+            <a:fillRect/>
+          </a:stretch>
+        </p:blipFill>
+        <p:spPr bwMode="auto">
+          <a:xfrm>
+            <a:off x="91889" y="3000372"/>
+            <a:ext cx="8909267" cy="2309810"/>
+          </a:xfrm>
+          <a:prstGeom prst="rect">
+            <a:avLst/>
+          </a:prstGeom>
+          <a:noFill/>
+        </p:spPr>
+      </p:pic>
+      <p:pic>
+        <p:nvPicPr>
+          <p:cNvPr id="1029" name="Picture 5" descr="C:\Users\Alex\Desktop\2+3.png"/>
+          <p:cNvPicPr>
+            <a:picLocks noChangeAspect="1" noChangeArrowheads="1"/>
+          </p:cNvPicPr>
+          <p:nvPr/>
+        </p:nvPicPr>
+        <p:blipFill>
+          <a:blip r:embed="rId5"/>
+          <a:srcRect/>
+          <a:stretch>
+            <a:fillRect/>
+          </a:stretch>
+        </p:blipFill>
+        <p:spPr bwMode="auto">
+          <a:xfrm>
+            <a:off x="91889" y="3000372"/>
+            <a:ext cx="8909267" cy="2309810"/>
+          </a:xfrm>
+          <a:prstGeom prst="rect">
+            <a:avLst/>
+          </a:prstGeom>
+          <a:noFill/>
+        </p:spPr>
+      </p:pic>
+      <p:pic>
+        <p:nvPicPr>
+          <p:cNvPr id="1030" name="Picture 6" descr="C:\Users\Alex\Desktop\4.png"/>
+          <p:cNvPicPr>
+            <a:picLocks noChangeAspect="1" noChangeArrowheads="1"/>
+          </p:cNvPicPr>
+          <p:nvPr/>
+        </p:nvPicPr>
+        <p:blipFill>
+          <a:blip r:embed="rId6"/>
+          <a:srcRect/>
+          <a:stretch>
+            <a:fillRect/>
+          </a:stretch>
+        </p:blipFill>
+        <p:spPr bwMode="auto">
+          <a:xfrm>
+            <a:off x="91889" y="3000372"/>
+            <a:ext cx="8909267" cy="2309810"/>
+          </a:xfrm>
+          <a:prstGeom prst="rect">
+            <a:avLst/>
+          </a:prstGeom>
+          <a:noFill/>
+        </p:spPr>
+      </p:pic>
+      <p:pic>
+        <p:nvPicPr>
+          <p:cNvPr id="1031" name="Picture 7" descr="C:\Users\Alex\Desktop\5.png"/>
+          <p:cNvPicPr>
+            <a:picLocks noChangeAspect="1" noChangeArrowheads="1"/>
+          </p:cNvPicPr>
+          <p:nvPr/>
+        </p:nvPicPr>
+        <p:blipFill>
+          <a:blip r:embed="rId7"/>
+          <a:srcRect/>
+          <a:stretch>
+            <a:fillRect/>
+          </a:stretch>
+        </p:blipFill>
+        <p:spPr bwMode="auto">
+          <a:xfrm>
+            <a:off x="91889" y="3000372"/>
+            <a:ext cx="8909267" cy="2309810"/>
+          </a:xfrm>
+          <a:prstGeom prst="rect">
+            <a:avLst/>
+          </a:prstGeom>
+          <a:noFill/>
+        </p:spPr>
+      </p:pic>
+      <p:pic>
+        <p:nvPicPr>
+          <p:cNvPr id="1032" name="Picture 8" descr="C:\Users\Alex\Desktop\4+5.png"/>
+          <p:cNvPicPr>
+            <a:picLocks noChangeAspect="1" noChangeArrowheads="1"/>
+          </p:cNvPicPr>
+          <p:nvPr/>
+        </p:nvPicPr>
+        <p:blipFill>
+          <a:blip r:embed="rId8"/>
+          <a:srcRect/>
+          <a:stretch>
+            <a:fillRect/>
+          </a:stretch>
+        </p:blipFill>
+        <p:spPr bwMode="auto">
+          <a:xfrm>
+            <a:off x="91889" y="3000372"/>
+            <a:ext cx="8909267" cy="2309810"/>
+          </a:xfrm>
+          <a:prstGeom prst="rect">
+            <a:avLst/>
+          </a:prstGeom>
+          <a:noFill/>
+        </p:spPr>
+      </p:pic>
+      <p:pic>
+        <p:nvPicPr>
+          <p:cNvPr id="1033" name="Picture 9" descr="C:\Users\Alex\Desktop\6.png"/>
+          <p:cNvPicPr>
+            <a:picLocks noChangeAspect="1" noChangeArrowheads="1"/>
+          </p:cNvPicPr>
+          <p:nvPr/>
+        </p:nvPicPr>
+        <p:blipFill>
+          <a:blip r:embed="rId9"/>
+          <a:srcRect/>
+          <a:stretch>
+            <a:fillRect/>
+          </a:stretch>
+        </p:blipFill>
+        <p:spPr bwMode="auto">
+          <a:xfrm>
+            <a:off x="91889" y="3000372"/>
+            <a:ext cx="8909267" cy="2309810"/>
+          </a:xfrm>
+          <a:prstGeom prst="rect">
+            <a:avLst/>
+          </a:prstGeom>
+          <a:noFill/>
+        </p:spPr>
+      </p:pic>
+      <p:pic>
+        <p:nvPicPr>
+          <p:cNvPr id="1034" name="Picture 10" descr="C:\Users\Alex\Desktop\1vs7.png"/>
+          <p:cNvPicPr>
+            <a:picLocks noChangeAspect="1" noChangeArrowheads="1"/>
+          </p:cNvPicPr>
+          <p:nvPr/>
+        </p:nvPicPr>
+        <p:blipFill>
+          <a:blip r:embed="rId10"/>
+          <a:srcRect/>
+          <a:stretch>
+            <a:fillRect/>
+          </a:stretch>
+        </p:blipFill>
+        <p:spPr bwMode="auto">
+          <a:xfrm>
+            <a:off x="91889" y="3000372"/>
+            <a:ext cx="8909267" cy="2309810"/>
           </a:xfrm>
           <a:prstGeom prst="rect">
             <a:avLst/>
@@ -4353,7 +4628,467 @@
   <p:timing>
     <p:tnLst>
       <p:par>
-        <p:cTn id="1" dur="indefinite" restart="never" nodeType="tmRoot"/>
+        <p:cTn id="1" dur="indefinite" restart="never" nodeType="tmRoot">
+          <p:childTnLst>
+            <p:seq concurrent="1" nextAc="seek">
+              <p:cTn id="2" dur="indefinite" nodeType="mainSeq">
+                <p:childTnLst>
+                  <p:par>
+                    <p:cTn id="3" fill="hold">
+                      <p:stCondLst>
+                        <p:cond delay="indefinite"/>
+                      </p:stCondLst>
+                      <p:childTnLst>
+                        <p:par>
+                          <p:cTn id="4" fill="hold">
+                            <p:stCondLst>
+                              <p:cond delay="0"/>
+                            </p:stCondLst>
+                            <p:childTnLst>
+                              <p:par>
+                                <p:cTn id="5" presetID="1" presetClass="entr" presetSubtype="0" fill="hold" nodeType="clickEffect">
+                                  <p:stCondLst>
+                                    <p:cond delay="0"/>
+                                  </p:stCondLst>
+                                  <p:childTnLst>
+                                    <p:set>
+                                      <p:cBhvr>
+                                        <p:cTn id="6" dur="1" fill="hold">
+                                          <p:stCondLst>
+                                            <p:cond delay="0"/>
+                                          </p:stCondLst>
+                                        </p:cTn>
+                                        <p:tgtEl>
+                                          <p:spTgt spid="1026"/>
+                                        </p:tgtEl>
+                                        <p:attrNameLst>
+                                          <p:attrName>style.visibility</p:attrName>
+                                        </p:attrNameLst>
+                                      </p:cBhvr>
+                                      <p:to>
+                                        <p:strVal val="visible"/>
+                                      </p:to>
+                                    </p:set>
+                                  </p:childTnLst>
+                                </p:cTn>
+                              </p:par>
+                            </p:childTnLst>
+                          </p:cTn>
+                        </p:par>
+                      </p:childTnLst>
+                    </p:cTn>
+                  </p:par>
+                  <p:par>
+                    <p:cTn id="7" fill="hold">
+                      <p:stCondLst>
+                        <p:cond delay="indefinite"/>
+                      </p:stCondLst>
+                      <p:childTnLst>
+                        <p:par>
+                          <p:cTn id="8" fill="hold">
+                            <p:stCondLst>
+                              <p:cond delay="0"/>
+                            </p:stCondLst>
+                            <p:childTnLst>
+                              <p:par>
+                                <p:cTn id="9" presetID="22" presetClass="entr" presetSubtype="8" fill="hold" nodeType="clickEffect">
+                                  <p:stCondLst>
+                                    <p:cond delay="0"/>
+                                  </p:stCondLst>
+                                  <p:childTnLst>
+                                    <p:set>
+                                      <p:cBhvr>
+                                        <p:cTn id="10" dur="1" fill="hold">
+                                          <p:stCondLst>
+                                            <p:cond delay="0"/>
+                                          </p:stCondLst>
+                                        </p:cTn>
+                                        <p:tgtEl>
+                                          <p:spTgt spid="1027"/>
+                                        </p:tgtEl>
+                                        <p:attrNameLst>
+                                          <p:attrName>style.visibility</p:attrName>
+                                        </p:attrNameLst>
+                                      </p:cBhvr>
+                                      <p:to>
+                                        <p:strVal val="visible"/>
+                                      </p:to>
+                                    </p:set>
+                                    <p:animEffect transition="in" filter="wipe(left)">
+                                      <p:cBhvr>
+                                        <p:cTn id="11" dur="1000"/>
+                                        <p:tgtEl>
+                                          <p:spTgt spid="1027"/>
+                                        </p:tgtEl>
+                                      </p:cBhvr>
+                                    </p:animEffect>
+                                  </p:childTnLst>
+                                </p:cTn>
+                              </p:par>
+                            </p:childTnLst>
+                          </p:cTn>
+                        </p:par>
+                      </p:childTnLst>
+                    </p:cTn>
+                  </p:par>
+                  <p:par>
+                    <p:cTn id="12" fill="hold">
+                      <p:stCondLst>
+                        <p:cond delay="indefinite"/>
+                      </p:stCondLst>
+                      <p:childTnLst>
+                        <p:par>
+                          <p:cTn id="13" fill="hold">
+                            <p:stCondLst>
+                              <p:cond delay="0"/>
+                            </p:stCondLst>
+                            <p:childTnLst>
+                              <p:par>
+                                <p:cTn id="14" presetID="22" presetClass="entr" presetSubtype="2" fill="hold" nodeType="clickEffect">
+                                  <p:stCondLst>
+                                    <p:cond delay="0"/>
+                                  </p:stCondLst>
+                                  <p:childTnLst>
+                                    <p:set>
+                                      <p:cBhvr>
+                                        <p:cTn id="15" dur="1" fill="hold">
+                                          <p:stCondLst>
+                                            <p:cond delay="0"/>
+                                          </p:stCondLst>
+                                        </p:cTn>
+                                        <p:tgtEl>
+                                          <p:spTgt spid="1028"/>
+                                        </p:tgtEl>
+                                        <p:attrNameLst>
+                                          <p:attrName>style.visibility</p:attrName>
+                                        </p:attrNameLst>
+                                      </p:cBhvr>
+                                      <p:to>
+                                        <p:strVal val="visible"/>
+                                      </p:to>
+                                    </p:set>
+                                    <p:animEffect transition="in" filter="wipe(right)">
+                                      <p:cBhvr>
+                                        <p:cTn id="16" dur="1000"/>
+                                        <p:tgtEl>
+                                          <p:spTgt spid="1028"/>
+                                        </p:tgtEl>
+                                      </p:cBhvr>
+                                    </p:animEffect>
+                                  </p:childTnLst>
+                                </p:cTn>
+                              </p:par>
+                            </p:childTnLst>
+                          </p:cTn>
+                        </p:par>
+                      </p:childTnLst>
+                    </p:cTn>
+                  </p:par>
+                  <p:par>
+                    <p:cTn id="17" fill="hold">
+                      <p:stCondLst>
+                        <p:cond delay="indefinite"/>
+                      </p:stCondLst>
+                      <p:childTnLst>
+                        <p:par>
+                          <p:cTn id="18" fill="hold">
+                            <p:stCondLst>
+                              <p:cond delay="0"/>
+                            </p:stCondLst>
+                            <p:childTnLst>
+                              <p:par>
+                                <p:cTn id="19" presetID="10" presetClass="entr" presetSubtype="0" fill="hold" nodeType="clickEffect">
+                                  <p:stCondLst>
+                                    <p:cond delay="0"/>
+                                  </p:stCondLst>
+                                  <p:childTnLst>
+                                    <p:set>
+                                      <p:cBhvr>
+                                        <p:cTn id="20" dur="1" fill="hold">
+                                          <p:stCondLst>
+                                            <p:cond delay="0"/>
+                                          </p:stCondLst>
+                                        </p:cTn>
+                                        <p:tgtEl>
+                                          <p:spTgt spid="1029"/>
+                                        </p:tgtEl>
+                                        <p:attrNameLst>
+                                          <p:attrName>style.visibility</p:attrName>
+                                        </p:attrNameLst>
+                                      </p:cBhvr>
+                                      <p:to>
+                                        <p:strVal val="visible"/>
+                                      </p:to>
+                                    </p:set>
+                                    <p:animEffect transition="in" filter="fade">
+                                      <p:cBhvr>
+                                        <p:cTn id="21" dur="500"/>
+                                        <p:tgtEl>
+                                          <p:spTgt spid="1029"/>
+                                        </p:tgtEl>
+                                      </p:cBhvr>
+                                    </p:animEffect>
+                                  </p:childTnLst>
+                                </p:cTn>
+                              </p:par>
+                            </p:childTnLst>
+                          </p:cTn>
+                        </p:par>
+                      </p:childTnLst>
+                    </p:cTn>
+                  </p:par>
+                  <p:par>
+                    <p:cTn id="22" fill="hold">
+                      <p:stCondLst>
+                        <p:cond delay="indefinite"/>
+                      </p:stCondLst>
+                      <p:childTnLst>
+                        <p:par>
+                          <p:cTn id="23" fill="hold">
+                            <p:stCondLst>
+                              <p:cond delay="0"/>
+                            </p:stCondLst>
+                            <p:childTnLst>
+                              <p:par>
+                                <p:cTn id="24" presetID="1" presetClass="entr" presetSubtype="0" fill="hold" nodeType="clickEffect">
+                                  <p:stCondLst>
+                                    <p:cond delay="0"/>
+                                  </p:stCondLst>
+                                  <p:childTnLst>
+                                    <p:set>
+                                      <p:cBhvr>
+                                        <p:cTn id="25" dur="1" fill="hold">
+                                          <p:stCondLst>
+                                            <p:cond delay="0"/>
+                                          </p:stCondLst>
+                                        </p:cTn>
+                                        <p:tgtEl>
+                                          <p:spTgt spid="1030"/>
+                                        </p:tgtEl>
+                                        <p:attrNameLst>
+                                          <p:attrName>style.visibility</p:attrName>
+                                        </p:attrNameLst>
+                                      </p:cBhvr>
+                                      <p:to>
+                                        <p:strVal val="visible"/>
+                                      </p:to>
+                                    </p:set>
+                                  </p:childTnLst>
+                                </p:cTn>
+                              </p:par>
+                            </p:childTnLst>
+                          </p:cTn>
+                        </p:par>
+                      </p:childTnLst>
+                    </p:cTn>
+                  </p:par>
+                  <p:par>
+                    <p:cTn id="26" fill="hold">
+                      <p:stCondLst>
+                        <p:cond delay="indefinite"/>
+                      </p:stCondLst>
+                      <p:childTnLst>
+                        <p:par>
+                          <p:cTn id="27" fill="hold">
+                            <p:stCondLst>
+                              <p:cond delay="0"/>
+                            </p:stCondLst>
+                            <p:childTnLst>
+                              <p:par>
+                                <p:cTn id="28" presetID="1" presetClass="entr" presetSubtype="0" fill="hold" nodeType="clickEffect">
+                                  <p:stCondLst>
+                                    <p:cond delay="0"/>
+                                  </p:stCondLst>
+                                  <p:childTnLst>
+                                    <p:set>
+                                      <p:cBhvr>
+                                        <p:cTn id="29" dur="1" fill="hold">
+                                          <p:stCondLst>
+                                            <p:cond delay="0"/>
+                                          </p:stCondLst>
+                                        </p:cTn>
+                                        <p:tgtEl>
+                                          <p:spTgt spid="1031"/>
+                                        </p:tgtEl>
+                                        <p:attrNameLst>
+                                          <p:attrName>style.visibility</p:attrName>
+                                        </p:attrNameLst>
+                                      </p:cBhvr>
+                                      <p:to>
+                                        <p:strVal val="visible"/>
+                                      </p:to>
+                                    </p:set>
+                                  </p:childTnLst>
+                                </p:cTn>
+                              </p:par>
+                            </p:childTnLst>
+                          </p:cTn>
+                        </p:par>
+                      </p:childTnLst>
+                    </p:cTn>
+                  </p:par>
+                  <p:par>
+                    <p:cTn id="30" fill="hold">
+                      <p:stCondLst>
+                        <p:cond delay="indefinite"/>
+                      </p:stCondLst>
+                      <p:childTnLst>
+                        <p:par>
+                          <p:cTn id="31" fill="hold">
+                            <p:stCondLst>
+                              <p:cond delay="0"/>
+                            </p:stCondLst>
+                            <p:childTnLst>
+                              <p:par>
+                                <p:cTn id="32" presetID="1" presetClass="entr" presetSubtype="0" fill="hold" nodeType="clickEffect">
+                                  <p:stCondLst>
+                                    <p:cond delay="0"/>
+                                  </p:stCondLst>
+                                  <p:childTnLst>
+                                    <p:set>
+                                      <p:cBhvr>
+                                        <p:cTn id="33" dur="1" fill="hold">
+                                          <p:stCondLst>
+                                            <p:cond delay="0"/>
+                                          </p:stCondLst>
+                                        </p:cTn>
+                                        <p:tgtEl>
+                                          <p:spTgt spid="1032"/>
+                                        </p:tgtEl>
+                                        <p:attrNameLst>
+                                          <p:attrName>style.visibility</p:attrName>
+                                        </p:attrNameLst>
+                                      </p:cBhvr>
+                                      <p:to>
+                                        <p:strVal val="visible"/>
+                                      </p:to>
+                                    </p:set>
+                                  </p:childTnLst>
+                                </p:cTn>
+                              </p:par>
+                            </p:childTnLst>
+                          </p:cTn>
+                        </p:par>
+                      </p:childTnLst>
+                    </p:cTn>
+                  </p:par>
+                  <p:par>
+                    <p:cTn id="34" fill="hold">
+                      <p:stCondLst>
+                        <p:cond delay="indefinite"/>
+                      </p:stCondLst>
+                      <p:childTnLst>
+                        <p:par>
+                          <p:cTn id="35" fill="hold">
+                            <p:stCondLst>
+                              <p:cond delay="0"/>
+                            </p:stCondLst>
+                            <p:childTnLst>
+                              <p:par>
+                                <p:cTn id="36" presetID="1" presetClass="entr" presetSubtype="0" fill="hold" nodeType="clickEffect">
+                                  <p:stCondLst>
+                                    <p:cond delay="0"/>
+                                  </p:stCondLst>
+                                  <p:childTnLst>
+                                    <p:set>
+                                      <p:cBhvr>
+                                        <p:cTn id="37" dur="1" fill="hold">
+                                          <p:stCondLst>
+                                            <p:cond delay="0"/>
+                                          </p:stCondLst>
+                                        </p:cTn>
+                                        <p:tgtEl>
+                                          <p:spTgt spid="1033"/>
+                                        </p:tgtEl>
+                                        <p:attrNameLst>
+                                          <p:attrName>style.visibility</p:attrName>
+                                        </p:attrNameLst>
+                                      </p:cBhvr>
+                                      <p:to>
+                                        <p:strVal val="visible"/>
+                                      </p:to>
+                                    </p:set>
+                                  </p:childTnLst>
+                                </p:cTn>
+                              </p:par>
+                            </p:childTnLst>
+                          </p:cTn>
+                        </p:par>
+                      </p:childTnLst>
+                    </p:cTn>
+                  </p:par>
+                  <p:par>
+                    <p:cTn id="38" fill="hold">
+                      <p:stCondLst>
+                        <p:cond delay="indefinite"/>
+                      </p:stCondLst>
+                      <p:childTnLst>
+                        <p:par>
+                          <p:cTn id="39" fill="hold">
+                            <p:stCondLst>
+                              <p:cond delay="0"/>
+                            </p:stCondLst>
+                            <p:childTnLst>
+                              <p:par>
+                                <p:cTn id="40" presetID="10" presetClass="entr" presetSubtype="0" fill="hold" nodeType="clickEffect">
+                                  <p:stCondLst>
+                                    <p:cond delay="0"/>
+                                  </p:stCondLst>
+                                  <p:childTnLst>
+                                    <p:set>
+                                      <p:cBhvr>
+                                        <p:cTn id="41" dur="1" fill="hold">
+                                          <p:stCondLst>
+                                            <p:cond delay="0"/>
+                                          </p:stCondLst>
+                                        </p:cTn>
+                                        <p:tgtEl>
+                                          <p:spTgt spid="1034"/>
+                                        </p:tgtEl>
+                                        <p:attrNameLst>
+                                          <p:attrName>style.visibility</p:attrName>
+                                        </p:attrNameLst>
+                                      </p:cBhvr>
+                                      <p:to>
+                                        <p:strVal val="visible"/>
+                                      </p:to>
+                                    </p:set>
+                                    <p:animEffect transition="in" filter="fade">
+                                      <p:cBhvr>
+                                        <p:cTn id="42" dur="500"/>
+                                        <p:tgtEl>
+                                          <p:spTgt spid="1034"/>
+                                        </p:tgtEl>
+                                      </p:cBhvr>
+                                    </p:animEffect>
+                                  </p:childTnLst>
+                                </p:cTn>
+                              </p:par>
+                            </p:childTnLst>
+                          </p:cTn>
+                        </p:par>
+                      </p:childTnLst>
+                    </p:cTn>
+                  </p:par>
+                </p:childTnLst>
+              </p:cTn>
+              <p:prevCondLst>
+                <p:cond evt="onPrev" delay="0">
+                  <p:tgtEl>
+                    <p:sldTgt/>
+                  </p:tgtEl>
+                </p:cond>
+              </p:prevCondLst>
+              <p:nextCondLst>
+                <p:cond evt="onNext" delay="0">
+                  <p:tgtEl>
+                    <p:sldTgt/>
+                  </p:tgtEl>
+                </p:cond>
+              </p:nextCondLst>
+            </p:seq>
+          </p:childTnLst>
+        </p:cTn>
       </p:par>
     </p:tnLst>
   </p:timing>
@@ -4825,7 +5560,6 @@
               <a:rPr lang="ro-RO" dirty="0" smtClean="0"/>
               <a:t>Analizarea tipurilor de distorsiuni de sunet provocate de deteriorări la nivelul șanțului</a:t>
             </a:r>
-            <a:endParaRPr lang="ro-RO" dirty="0" smtClean="0"/>
           </a:p>
           <a:p>
             <a:r>
@@ -4848,28 +5582,24 @@
               <a:rPr lang="ro-RO" dirty="0" smtClean="0"/>
               <a:t> audio</a:t>
             </a:r>
-            <a:endParaRPr lang="ro-RO" dirty="0" smtClean="0"/>
           </a:p>
           <a:p>
             <a:r>
               <a:rPr lang="ro-RO" dirty="0" smtClean="0"/>
               <a:t>Etichetarea unui număr suficient de mare de date pentru antrenarea rețelei neuronale folosind înregistrări stereo ale unor discuri mono</a:t>
             </a:r>
-            <a:endParaRPr lang="ro-RO" dirty="0" smtClean="0"/>
           </a:p>
           <a:p>
             <a:r>
               <a:rPr lang="ro-RO" dirty="0" smtClean="0"/>
               <a:t>Generarea și optimizarea seturilor de antrenare pe baza etichetărilor menționate mai sus</a:t>
             </a:r>
-            <a:endParaRPr lang="ro-RO" dirty="0" smtClean="0"/>
           </a:p>
           <a:p>
             <a:r>
               <a:rPr lang="ro-RO" dirty="0" smtClean="0"/>
               <a:t>Corectarea intervalelor cu distorsiuni folosind predicție liniară, coeficienții acesteia calculându-se cu  metoda lui Burg</a:t>
             </a:r>
-            <a:endParaRPr lang="ro-RO" dirty="0" smtClean="0"/>
           </a:p>
           <a:p>
             <a:r>
@@ -5279,7 +6009,7 @@
         <p:spPr>
           <a:xfrm>
             <a:off x="214282" y="1000108"/>
-            <a:ext cx="8715436" cy="3416320"/>
+            <a:ext cx="8715436" cy="3046988"/>
           </a:xfrm>
           <a:prstGeom prst="rect">
             <a:avLst/>
@@ -5298,11 +6028,15 @@
             </a:pPr>
             <a:r>
               <a:rPr lang="ro-RO" sz="2400" dirty="0" smtClean="0"/>
-              <a:t> Formatele audio analogice mecanice stochează semnalul audio sub forma unei oscilații mecanice gravate într-un mediu solid sub forma </a:t>
+              <a:t> Formatele audio analogice mecanice stochează semnalul audio sub forma unei oscilații mecanice gravate într-un mediu </a:t>
             </a:r>
             <a:r>
               <a:rPr lang="ro-RO" sz="2400" dirty="0" smtClean="0"/>
-              <a:t>unei indentații.</a:t>
+              <a:t>solid</a:t>
+            </a:r>
+            <a:r>
+              <a:rPr lang="en-US" sz="2400" dirty="0" smtClean="0"/>
+              <a:t>.</a:t>
             </a:r>
             <a:endParaRPr lang="ro-RO" sz="2400" dirty="0" smtClean="0"/>
           </a:p>

</xml_diff>

<commit_message>
Reverted fixing a bug that didn't exist. NN training done. Prezentare almost there
</commit_message>
<xml_diff>
--- a/docs/Prezentare.pptx
+++ b/docs/Prezentare.pptx
@@ -14,8 +14,8 @@
     <p:sldId id="262" r:id="rId8"/>
     <p:sldId id="263" r:id="rId9"/>
     <p:sldId id="264" r:id="rId10"/>
-    <p:sldId id="270" r:id="rId11"/>
-    <p:sldId id="265" r:id="rId12"/>
+    <p:sldId id="265" r:id="rId11"/>
+    <p:sldId id="270" r:id="rId12"/>
     <p:sldId id="266" r:id="rId13"/>
     <p:sldId id="267" r:id="rId14"/>
     <p:sldId id="269" r:id="rId15"/>
@@ -302,7 +302,7 @@
             <a:fld id="{6DC0E1D0-27EE-4FDB-B2E1-7C89D03F1E5D}" type="datetimeFigureOut">
               <a:rPr lang="ro-RO" smtClean="0"/>
               <a:pPr/>
-              <a:t>04.07.2018</a:t>
+              <a:t>05.07.2018</a:t>
             </a:fld>
             <a:endParaRPr lang="ro-RO" dirty="0"/>
           </a:p>
@@ -469,7 +469,7 @@
             <a:fld id="{6DC0E1D0-27EE-4FDB-B2E1-7C89D03F1E5D}" type="datetimeFigureOut">
               <a:rPr lang="ro-RO" smtClean="0"/>
               <a:pPr/>
-              <a:t>04.07.2018</a:t>
+              <a:t>05.07.2018</a:t>
             </a:fld>
             <a:endParaRPr lang="ro-RO" dirty="0"/>
           </a:p>
@@ -646,7 +646,7 @@
             <a:fld id="{6DC0E1D0-27EE-4FDB-B2E1-7C89D03F1E5D}" type="datetimeFigureOut">
               <a:rPr lang="ro-RO" smtClean="0"/>
               <a:pPr/>
-              <a:t>04.07.2018</a:t>
+              <a:t>05.07.2018</a:t>
             </a:fld>
             <a:endParaRPr lang="ro-RO" dirty="0"/>
           </a:p>
@@ -813,7 +813,7 @@
             <a:fld id="{6DC0E1D0-27EE-4FDB-B2E1-7C89D03F1E5D}" type="datetimeFigureOut">
               <a:rPr lang="ro-RO" smtClean="0"/>
               <a:pPr/>
-              <a:t>04.07.2018</a:t>
+              <a:t>05.07.2018</a:t>
             </a:fld>
             <a:endParaRPr lang="ro-RO" dirty="0"/>
           </a:p>
@@ -1056,7 +1056,7 @@
             <a:fld id="{6DC0E1D0-27EE-4FDB-B2E1-7C89D03F1E5D}" type="datetimeFigureOut">
               <a:rPr lang="ro-RO" smtClean="0"/>
               <a:pPr/>
-              <a:t>04.07.2018</a:t>
+              <a:t>05.07.2018</a:t>
             </a:fld>
             <a:endParaRPr lang="ro-RO" dirty="0"/>
           </a:p>
@@ -1341,7 +1341,7 @@
             <a:fld id="{6DC0E1D0-27EE-4FDB-B2E1-7C89D03F1E5D}" type="datetimeFigureOut">
               <a:rPr lang="ro-RO" smtClean="0"/>
               <a:pPr/>
-              <a:t>04.07.2018</a:t>
+              <a:t>05.07.2018</a:t>
             </a:fld>
             <a:endParaRPr lang="ro-RO" dirty="0"/>
           </a:p>
@@ -1760,7 +1760,7 @@
             <a:fld id="{6DC0E1D0-27EE-4FDB-B2E1-7C89D03F1E5D}" type="datetimeFigureOut">
               <a:rPr lang="ro-RO" smtClean="0"/>
               <a:pPr/>
-              <a:t>04.07.2018</a:t>
+              <a:t>05.07.2018</a:t>
             </a:fld>
             <a:endParaRPr lang="ro-RO" dirty="0"/>
           </a:p>
@@ -1875,7 +1875,7 @@
             <a:fld id="{6DC0E1D0-27EE-4FDB-B2E1-7C89D03F1E5D}" type="datetimeFigureOut">
               <a:rPr lang="ro-RO" smtClean="0"/>
               <a:pPr/>
-              <a:t>04.07.2018</a:t>
+              <a:t>05.07.2018</a:t>
             </a:fld>
             <a:endParaRPr lang="ro-RO" dirty="0"/>
           </a:p>
@@ -1967,7 +1967,7 @@
             <a:fld id="{6DC0E1D0-27EE-4FDB-B2E1-7C89D03F1E5D}" type="datetimeFigureOut">
               <a:rPr lang="ro-RO" smtClean="0"/>
               <a:pPr/>
-              <a:t>04.07.2018</a:t>
+              <a:t>05.07.2018</a:t>
             </a:fld>
             <a:endParaRPr lang="ro-RO" dirty="0"/>
           </a:p>
@@ -2241,7 +2241,7 @@
             <a:fld id="{6DC0E1D0-27EE-4FDB-B2E1-7C89D03F1E5D}" type="datetimeFigureOut">
               <a:rPr lang="ro-RO" smtClean="0"/>
               <a:pPr/>
-              <a:t>04.07.2018</a:t>
+              <a:t>05.07.2018</a:t>
             </a:fld>
             <a:endParaRPr lang="ro-RO" dirty="0"/>
           </a:p>
@@ -2491,7 +2491,7 @@
             <a:fld id="{6DC0E1D0-27EE-4FDB-B2E1-7C89D03F1E5D}" type="datetimeFigureOut">
               <a:rPr lang="ro-RO" smtClean="0"/>
               <a:pPr/>
-              <a:t>04.07.2018</a:t>
+              <a:t>05.07.2018</a:t>
             </a:fld>
             <a:endParaRPr lang="ro-RO" dirty="0"/>
           </a:p>
@@ -2701,7 +2701,7 @@
             <a:fld id="{6DC0E1D0-27EE-4FDB-B2E1-7C89D03F1E5D}" type="datetimeFigureOut">
               <a:rPr lang="ro-RO" smtClean="0"/>
               <a:pPr/>
-              <a:t>04.07.2018</a:t>
+              <a:t>05.07.2018</a:t>
             </a:fld>
             <a:endParaRPr lang="ro-RO" dirty="0"/>
           </a:p>
@@ -3768,213 +3768,6 @@
           <a:chExt cx="0" cy="0"/>
         </a:xfrm>
       </p:grpSpPr>
-      <p:pic>
-        <p:nvPicPr>
-          <p:cNvPr id="7170" name="Picture 2"/>
-          <p:cNvPicPr>
-            <a:picLocks noChangeAspect="1" noChangeArrowheads="1"/>
-          </p:cNvPicPr>
-          <p:nvPr/>
-        </p:nvPicPr>
-        <p:blipFill>
-          <a:blip r:embed="rId2"/>
-          <a:srcRect/>
-          <a:stretch>
-            <a:fillRect/>
-          </a:stretch>
-        </p:blipFill>
-        <p:spPr bwMode="auto">
-          <a:xfrm>
-            <a:off x="2071670" y="2928934"/>
-            <a:ext cx="4857784" cy="1948888"/>
-          </a:xfrm>
-          <a:prstGeom prst="rect">
-            <a:avLst/>
-          </a:prstGeom>
-          <a:noFill/>
-          <a:ln w="9525">
-            <a:noFill/>
-            <a:miter lim="800000"/>
-            <a:headEnd/>
-            <a:tailEnd/>
-          </a:ln>
-          <a:effectLst/>
-        </p:spPr>
-      </p:pic>
-      <p:sp>
-        <p:nvSpPr>
-          <p:cNvPr id="2" name="Titlu 1"/>
-          <p:cNvSpPr>
-            <a:spLocks noGrp="1"/>
-          </p:cNvSpPr>
-          <p:nvPr>
-            <p:ph type="title"/>
-          </p:nvPr>
-        </p:nvSpPr>
-        <p:spPr/>
-        <p:txBody>
-          <a:bodyPr>
-            <a:normAutofit fontScale="90000"/>
-          </a:bodyPr>
-          <a:lstStyle/>
-          <a:p>
-            <a:r>
-              <a:rPr lang="ro-RO" dirty="0" smtClean="0"/>
-              <a:t>Tabel cu rezultate NN; </a:t>
-            </a:r>
-            <a:r>
-              <a:rPr lang="ro-RO" dirty="0" err="1" smtClean="0"/>
-              <a:t>NN</a:t>
-            </a:r>
-            <a:r>
-              <a:rPr lang="ro-RO" dirty="0" smtClean="0"/>
-              <a:t> </a:t>
-            </a:r>
-            <a:r>
-              <a:rPr lang="ro-RO" dirty="0" err="1" smtClean="0"/>
-              <a:t>vs</a:t>
-            </a:r>
-            <a:r>
-              <a:rPr lang="ro-RO" dirty="0" smtClean="0"/>
-              <a:t> alte metode (titlu temporar)</a:t>
-            </a:r>
-            <a:endParaRPr lang="ro-RO" dirty="0"/>
-          </a:p>
-        </p:txBody>
-      </p:sp>
-      <p:pic>
-        <p:nvPicPr>
-          <p:cNvPr id="2395" name="Picture 347"/>
-          <p:cNvPicPr>
-            <a:picLocks noChangeAspect="1" noChangeArrowheads="1"/>
-          </p:cNvPicPr>
-          <p:nvPr/>
-        </p:nvPicPr>
-        <p:blipFill>
-          <a:blip r:embed="rId3"/>
-          <a:srcRect/>
-          <a:stretch>
-            <a:fillRect/>
-          </a:stretch>
-        </p:blipFill>
-        <p:spPr bwMode="auto">
-          <a:xfrm>
-            <a:off x="0" y="1928802"/>
-            <a:ext cx="9144000" cy="4353339"/>
-          </a:xfrm>
-          <a:prstGeom prst="rect">
-            <a:avLst/>
-          </a:prstGeom>
-          <a:noFill/>
-          <a:ln w="9525">
-            <a:noFill/>
-            <a:miter lim="800000"/>
-            <a:headEnd/>
-            <a:tailEnd/>
-          </a:ln>
-          <a:effectLst/>
-        </p:spPr>
-      </p:pic>
-    </p:spTree>
-  </p:cSld>
-  <p:clrMapOvr>
-    <a:masterClrMapping/>
-  </p:clrMapOvr>
-  <p:timing>
-    <p:tnLst>
-      <p:par>
-        <p:cTn id="1" dur="indefinite" restart="never" nodeType="tmRoot">
-          <p:childTnLst>
-            <p:seq concurrent="1" nextAc="seek">
-              <p:cTn id="2" dur="indefinite" nodeType="mainSeq">
-                <p:childTnLst>
-                  <p:par>
-                    <p:cTn id="3" fill="hold">
-                      <p:stCondLst>
-                        <p:cond delay="indefinite"/>
-                      </p:stCondLst>
-                      <p:childTnLst>
-                        <p:par>
-                          <p:cTn id="4" fill="hold">
-                            <p:stCondLst>
-                              <p:cond delay="0"/>
-                            </p:stCondLst>
-                            <p:childTnLst>
-                              <p:par>
-                                <p:cTn id="5" presetID="1" presetClass="entr" presetSubtype="0" fill="hold" nodeType="clickEffect">
-                                  <p:stCondLst>
-                                    <p:cond delay="0"/>
-                                  </p:stCondLst>
-                                  <p:childTnLst>
-                                    <p:set>
-                                      <p:cBhvr>
-                                        <p:cTn id="6" dur="1" fill="hold">
-                                          <p:stCondLst>
-                                            <p:cond delay="0"/>
-                                          </p:stCondLst>
-                                        </p:cTn>
-                                        <p:tgtEl>
-                                          <p:spTgt spid="2395"/>
-                                        </p:tgtEl>
-                                        <p:attrNameLst>
-                                          <p:attrName>style.visibility</p:attrName>
-                                        </p:attrNameLst>
-                                      </p:cBhvr>
-                                      <p:to>
-                                        <p:strVal val="visible"/>
-                                      </p:to>
-                                    </p:set>
-                                  </p:childTnLst>
-                                </p:cTn>
-                              </p:par>
-                            </p:childTnLst>
-                          </p:cTn>
-                        </p:par>
-                      </p:childTnLst>
-                    </p:cTn>
-                  </p:par>
-                </p:childTnLst>
-              </p:cTn>
-              <p:prevCondLst>
-                <p:cond evt="onPrev" delay="0">
-                  <p:tgtEl>
-                    <p:sldTgt/>
-                  </p:tgtEl>
-                </p:cond>
-              </p:prevCondLst>
-              <p:nextCondLst>
-                <p:cond evt="onNext" delay="0">
-                  <p:tgtEl>
-                    <p:sldTgt/>
-                  </p:tgtEl>
-                </p:cond>
-              </p:nextCondLst>
-            </p:seq>
-          </p:childTnLst>
-        </p:cTn>
-      </p:par>
-    </p:tnLst>
-  </p:timing>
-</p:sld>
-</file>
-
-<file path=ppt/slides/slide11.xml><?xml version="1.0" encoding="utf-8"?>
-<p:sld xmlns:a="http://schemas.openxmlformats.org/drawingml/2006/main" xmlns:r="http://schemas.openxmlformats.org/officeDocument/2006/relationships" xmlns:p="http://schemas.openxmlformats.org/presentationml/2006/main">
-  <p:cSld>
-    <p:spTree>
-      <p:nvGrpSpPr>
-        <p:cNvPr id="1" name=""/>
-        <p:cNvGrpSpPr/>
-        <p:nvPr/>
-      </p:nvGrpSpPr>
-      <p:grpSpPr>
-        <a:xfrm>
-          <a:off x="0" y="0"/>
-          <a:ext cx="0" cy="0"/>
-          <a:chOff x="0" y="0"/>
-          <a:chExt cx="0" cy="0"/>
-        </a:xfrm>
-      </p:grpSpPr>
       <p:sp>
         <p:nvSpPr>
           <p:cNvPr id="4" name="Dreptunghi 3"/>
@@ -4221,6 +4014,349 @@
                                         </p:tgtEl>
                                       </p:cBhvr>
                                     </p:animEffect>
+                                  </p:childTnLst>
+                                </p:cTn>
+                              </p:par>
+                            </p:childTnLst>
+                          </p:cTn>
+                        </p:par>
+                      </p:childTnLst>
+                    </p:cTn>
+                  </p:par>
+                </p:childTnLst>
+              </p:cTn>
+              <p:prevCondLst>
+                <p:cond evt="onPrev" delay="0">
+                  <p:tgtEl>
+                    <p:sldTgt/>
+                  </p:tgtEl>
+                </p:cond>
+              </p:prevCondLst>
+              <p:nextCondLst>
+                <p:cond evt="onNext" delay="0">
+                  <p:tgtEl>
+                    <p:sldTgt/>
+                  </p:tgtEl>
+                </p:cond>
+              </p:nextCondLst>
+            </p:seq>
+          </p:childTnLst>
+        </p:cTn>
+      </p:par>
+    </p:tnLst>
+  </p:timing>
+</p:sld>
+</file>
+
+<file path=ppt/slides/slide11.xml><?xml version="1.0" encoding="utf-8"?>
+<p:sld xmlns:a="http://schemas.openxmlformats.org/drawingml/2006/main" xmlns:r="http://schemas.openxmlformats.org/officeDocument/2006/relationships" xmlns:p="http://schemas.openxmlformats.org/presentationml/2006/main">
+  <p:cSld>
+    <p:spTree>
+      <p:nvGrpSpPr>
+        <p:cNvPr id="1" name=""/>
+        <p:cNvGrpSpPr/>
+        <p:nvPr/>
+      </p:nvGrpSpPr>
+      <p:grpSpPr>
+        <a:xfrm>
+          <a:off x="0" y="0"/>
+          <a:ext cx="0" cy="0"/>
+          <a:chOff x="0" y="0"/>
+          <a:chExt cx="0" cy="0"/>
+        </a:xfrm>
+      </p:grpSpPr>
+      <p:pic>
+        <p:nvPicPr>
+          <p:cNvPr id="7170" name="Picture 2"/>
+          <p:cNvPicPr>
+            <a:picLocks noChangeAspect="1" noChangeArrowheads="1"/>
+          </p:cNvPicPr>
+          <p:nvPr/>
+        </p:nvPicPr>
+        <p:blipFill>
+          <a:blip r:embed="rId2"/>
+          <a:srcRect/>
+          <a:stretch>
+            <a:fillRect/>
+          </a:stretch>
+        </p:blipFill>
+        <p:spPr bwMode="auto">
+          <a:xfrm>
+            <a:off x="2071670" y="2928934"/>
+            <a:ext cx="4857784" cy="1948888"/>
+          </a:xfrm>
+          <a:prstGeom prst="rect">
+            <a:avLst/>
+          </a:prstGeom>
+          <a:noFill/>
+          <a:ln w="9525">
+            <a:noFill/>
+            <a:miter lim="800000"/>
+            <a:headEnd/>
+            <a:tailEnd/>
+          </a:ln>
+          <a:effectLst/>
+        </p:spPr>
+      </p:pic>
+      <p:pic>
+        <p:nvPicPr>
+          <p:cNvPr id="2395" name="Picture 347"/>
+          <p:cNvPicPr>
+            <a:picLocks noChangeAspect="1" noChangeArrowheads="1"/>
+          </p:cNvPicPr>
+          <p:nvPr/>
+        </p:nvPicPr>
+        <p:blipFill>
+          <a:blip r:embed="rId3"/>
+          <a:srcRect/>
+          <a:stretch>
+            <a:fillRect/>
+          </a:stretch>
+        </p:blipFill>
+        <p:spPr bwMode="auto">
+          <a:xfrm>
+            <a:off x="0" y="1928802"/>
+            <a:ext cx="9144000" cy="4353339"/>
+          </a:xfrm>
+          <a:prstGeom prst="rect">
+            <a:avLst/>
+          </a:prstGeom>
+          <a:noFill/>
+          <a:ln w="9525">
+            <a:noFill/>
+            <a:miter lim="800000"/>
+            <a:headEnd/>
+            <a:tailEnd/>
+          </a:ln>
+          <a:effectLst/>
+        </p:spPr>
+      </p:pic>
+      <p:sp>
+        <p:nvSpPr>
+          <p:cNvPr id="2" name="Titlu 1"/>
+          <p:cNvSpPr>
+            <a:spLocks noGrp="1"/>
+          </p:cNvSpPr>
+          <p:nvPr>
+            <p:ph type="title"/>
+          </p:nvPr>
+        </p:nvSpPr>
+        <p:spPr>
+          <a:xfrm>
+            <a:off x="457200" y="142852"/>
+            <a:ext cx="8229600" cy="1797040"/>
+          </a:xfrm>
+        </p:spPr>
+        <p:txBody>
+          <a:bodyPr>
+            <a:normAutofit fontScale="90000"/>
+          </a:bodyPr>
+          <a:lstStyle/>
+          <a:p>
+            <a:r>
+              <a:rPr lang="ro-RO" dirty="0" smtClean="0"/>
+              <a:t>Rețea neuronală </a:t>
+            </a:r>
+            <a:r>
+              <a:rPr lang="ro-RO" dirty="0" err="1" smtClean="0"/>
+              <a:t>vs</a:t>
+            </a:r>
+            <a:r>
+              <a:rPr lang="ro-RO" dirty="0" smtClean="0"/>
+              <a:t> alți clasificatori</a:t>
+            </a:r>
+            <a:br>
+              <a:rPr lang="ro-RO" dirty="0" smtClean="0"/>
+            </a:br>
+            <a:r>
+              <a:rPr lang="ro-RO" dirty="0" smtClean="0"/>
+              <a:t>Diferite configurații ale NN și a setului de antrenare</a:t>
+            </a:r>
+            <a:endParaRPr lang="ro-RO" dirty="0"/>
+          </a:p>
+        </p:txBody>
+      </p:sp>
+      <p:pic>
+        <p:nvPicPr>
+          <p:cNvPr id="1026" name="Picture 2"/>
+          <p:cNvPicPr>
+            <a:picLocks noChangeAspect="1" noChangeArrowheads="1"/>
+          </p:cNvPicPr>
+          <p:nvPr/>
+        </p:nvPicPr>
+        <p:blipFill>
+          <a:blip r:embed="rId4"/>
+          <a:srcRect/>
+          <a:stretch>
+            <a:fillRect/>
+          </a:stretch>
+        </p:blipFill>
+        <p:spPr bwMode="auto">
+          <a:xfrm>
+            <a:off x="0" y="3071810"/>
+            <a:ext cx="9144000" cy="1830103"/>
+          </a:xfrm>
+          <a:prstGeom prst="rect">
+            <a:avLst/>
+          </a:prstGeom>
+          <a:noFill/>
+          <a:ln w="9525">
+            <a:noFill/>
+            <a:miter lim="800000"/>
+            <a:headEnd/>
+            <a:tailEnd/>
+          </a:ln>
+          <a:effectLst/>
+        </p:spPr>
+      </p:pic>
+    </p:spTree>
+  </p:cSld>
+  <p:clrMapOvr>
+    <a:masterClrMapping/>
+  </p:clrMapOvr>
+  <p:timing>
+    <p:tnLst>
+      <p:par>
+        <p:cTn id="1" dur="indefinite" restart="never" nodeType="tmRoot">
+          <p:childTnLst>
+            <p:seq concurrent="1" nextAc="seek">
+              <p:cTn id="2" dur="indefinite" nodeType="mainSeq">
+                <p:childTnLst>
+                  <p:par>
+                    <p:cTn id="3" fill="hold">
+                      <p:stCondLst>
+                        <p:cond delay="indefinite"/>
+                      </p:stCondLst>
+                      <p:childTnLst>
+                        <p:par>
+                          <p:cTn id="4" fill="hold">
+                            <p:stCondLst>
+                              <p:cond delay="0"/>
+                            </p:stCondLst>
+                            <p:childTnLst>
+                              <p:par>
+                                <p:cTn id="5" presetID="1" presetClass="entr" presetSubtype="0" fill="hold" nodeType="clickEffect">
+                                  <p:stCondLst>
+                                    <p:cond delay="0"/>
+                                  </p:stCondLst>
+                                  <p:childTnLst>
+                                    <p:set>
+                                      <p:cBhvr>
+                                        <p:cTn id="6" dur="1" fill="hold">
+                                          <p:stCondLst>
+                                            <p:cond delay="0"/>
+                                          </p:stCondLst>
+                                        </p:cTn>
+                                        <p:tgtEl>
+                                          <p:spTgt spid="2395"/>
+                                        </p:tgtEl>
+                                        <p:attrNameLst>
+                                          <p:attrName>style.visibility</p:attrName>
+                                        </p:attrNameLst>
+                                      </p:cBhvr>
+                                      <p:to>
+                                        <p:strVal val="visible"/>
+                                      </p:to>
+                                    </p:set>
+                                  </p:childTnLst>
+                                </p:cTn>
+                              </p:par>
+                            </p:childTnLst>
+                          </p:cTn>
+                        </p:par>
+                      </p:childTnLst>
+                    </p:cTn>
+                  </p:par>
+                  <p:par>
+                    <p:cTn id="7" fill="hold">
+                      <p:stCondLst>
+                        <p:cond delay="indefinite"/>
+                      </p:stCondLst>
+                      <p:childTnLst>
+                        <p:par>
+                          <p:cTn id="8" fill="hold">
+                            <p:stCondLst>
+                              <p:cond delay="0"/>
+                            </p:stCondLst>
+                            <p:childTnLst>
+                              <p:par>
+                                <p:cTn id="9" presetID="1" presetClass="exit" presetSubtype="0" fill="hold" nodeType="clickEffect">
+                                  <p:stCondLst>
+                                    <p:cond delay="0"/>
+                                  </p:stCondLst>
+                                  <p:childTnLst>
+                                    <p:set>
+                                      <p:cBhvr>
+                                        <p:cTn id="10" dur="1" fill="hold">
+                                          <p:stCondLst>
+                                            <p:cond delay="0"/>
+                                          </p:stCondLst>
+                                        </p:cTn>
+                                        <p:tgtEl>
+                                          <p:spTgt spid="2395"/>
+                                        </p:tgtEl>
+                                        <p:attrNameLst>
+                                          <p:attrName>style.visibility</p:attrName>
+                                        </p:attrNameLst>
+                                      </p:cBhvr>
+                                      <p:to>
+                                        <p:strVal val="hidden"/>
+                                      </p:to>
+                                    </p:set>
+                                  </p:childTnLst>
+                                </p:cTn>
+                              </p:par>
+                              <p:par>
+                                <p:cTn id="11" presetID="1" presetClass="entr" presetSubtype="0" fill="hold" nodeType="withEffect">
+                                  <p:stCondLst>
+                                    <p:cond delay="0"/>
+                                  </p:stCondLst>
+                                  <p:childTnLst>
+                                    <p:set>
+                                      <p:cBhvr>
+                                        <p:cTn id="12" dur="1" fill="hold">
+                                          <p:stCondLst>
+                                            <p:cond delay="0"/>
+                                          </p:stCondLst>
+                                        </p:cTn>
+                                        <p:tgtEl>
+                                          <p:spTgt spid="1026"/>
+                                        </p:tgtEl>
+                                        <p:attrNameLst>
+                                          <p:attrName>style.visibility</p:attrName>
+                                        </p:attrNameLst>
+                                      </p:cBhvr>
+                                      <p:to>
+                                        <p:strVal val="visible"/>
+                                      </p:to>
+                                    </p:set>
+                                  </p:childTnLst>
+                                </p:cTn>
+                              </p:par>
+                              <p:par>
+                                <p:cTn id="13" presetID="1" presetClass="exit" presetSubtype="0" fill="hold" nodeType="withEffect">
+                                  <p:stCondLst>
+                                    <p:cond delay="0"/>
+                                  </p:stCondLst>
+                                  <p:childTnLst>
+                                    <p:set>
+                                      <p:cBhvr>
+                                        <p:cTn id="14" dur="1" fill="hold">
+                                          <p:stCondLst>
+                                            <p:cond delay="0"/>
+                                          </p:stCondLst>
+                                        </p:cTn>
+                                        <p:tgtEl>
+                                          <p:spTgt spid="7170"/>
+                                        </p:tgtEl>
+                                        <p:attrNameLst>
+                                          <p:attrName>style.visibility</p:attrName>
+                                        </p:attrNameLst>
+                                      </p:cBhvr>
+                                      <p:to>
+                                        <p:strVal val="hidden"/>
+                                      </p:to>
+                                    </p:set>
                                   </p:childTnLst>
                                 </p:cTn>
                               </p:par>
@@ -6028,11 +6164,7 @@
             </a:pPr>
             <a:r>
               <a:rPr lang="ro-RO" sz="2400" dirty="0" smtClean="0"/>
-              <a:t> Formatele audio analogice mecanice stochează semnalul audio sub forma unei oscilații mecanice gravate într-un mediu </a:t>
-            </a:r>
-            <a:r>
-              <a:rPr lang="ro-RO" sz="2400" dirty="0" smtClean="0"/>
-              <a:t>solid</a:t>
+              <a:t> Formatele audio analogice mecanice stochează semnalul audio sub forma unei oscilații mecanice gravate într-un mediu solid</a:t>
             </a:r>
             <a:r>
               <a:rPr lang="en-US" sz="2400" dirty="0" smtClean="0"/>

</xml_diff>